<commit_message>
API partially commplete setup
</commit_message>
<xml_diff>
--- a/Geospatial Online Project.pptx
+++ b/Geospatial Online Project.pptx
@@ -3700,8 +3700,8 @@
         </p:nvSpPr>
         <p:spPr>
           <a:xfrm>
-            <a:off x="2217106" y="323867"/>
-            <a:ext cx="6050071" cy="663880"/>
+            <a:off x="2217106" y="-110716"/>
+            <a:ext cx="6050071" cy="530963"/>
           </a:xfrm>
           <a:noFill/>
         </p:spPr>
@@ -3735,8 +3735,8 @@
         </p:nvSpPr>
         <p:spPr>
           <a:xfrm>
-            <a:off x="0" y="1141607"/>
-            <a:ext cx="3469709" cy="1754326"/>
+            <a:off x="1" y="420247"/>
+            <a:ext cx="2661920" cy="1446550"/>
           </a:xfrm>
           <a:prstGeom prst="rect">
             <a:avLst/>
@@ -3755,35 +3755,35 @@
           <a:lstStyle/>
           <a:p>
             <a:r>
-              <a:rPr lang="en-US" b="1" dirty="0" smtClean="0"/>
+              <a:rPr lang="en-US" sz="1400" b="1" dirty="0" smtClean="0"/>
               <a:t>user schema</a:t>
             </a:r>
           </a:p>
           <a:p>
             <a:r>
-              <a:rPr lang="en-US" dirty="0" smtClean="0"/>
+              <a:rPr lang="en-US" sz="1400" dirty="0" smtClean="0"/>
               <a:t>-username: string</a:t>
             </a:r>
           </a:p>
           <a:p>
             <a:r>
-              <a:rPr lang="en-US" dirty="0" smtClean="0"/>
+              <a:rPr lang="en-US" sz="1400" dirty="0" smtClean="0"/>
               <a:t>-name: string</a:t>
             </a:r>
           </a:p>
           <a:p>
             <a:r>
-              <a:rPr lang="en-US" dirty="0" smtClean="0"/>
+              <a:rPr lang="en-US" sz="1400" dirty="0" smtClean="0"/>
               <a:t>-password. string</a:t>
             </a:r>
           </a:p>
           <a:p>
             <a:r>
-              <a:rPr lang="en-US" dirty="0" smtClean="0"/>
+              <a:rPr lang="en-US" sz="1400" dirty="0" smtClean="0"/>
               <a:t>-</a:t>
             </a:r>
             <a:r>
-              <a:rPr lang="en-US" dirty="0" smtClean="0">
+              <a:rPr lang="en-US" sz="1400" dirty="0" smtClean="0">
                 <a:solidFill>
                   <a:srgbClr val="FF0000"/>
                 </a:solidFill>
@@ -3791,7 +3791,7 @@
               <a:t>projects</a:t>
             </a:r>
             <a:r>
-              <a:rPr lang="en-US" dirty="0" smtClean="0"/>
+              <a:rPr lang="en-US" sz="1400" dirty="0" smtClean="0"/>
               <a:t>: []. // set of project id</a:t>
             </a:r>
           </a:p>
@@ -3808,8 +3808,8 @@
         </p:nvSpPr>
         <p:spPr>
           <a:xfrm>
-            <a:off x="8000404" y="970767"/>
-            <a:ext cx="3987157" cy="2862322"/>
+            <a:off x="7863840" y="1076959"/>
+            <a:ext cx="4123721" cy="2369880"/>
           </a:xfrm>
           <a:prstGeom prst="rect">
             <a:avLst/>
@@ -3828,31 +3828,31 @@
           <a:lstStyle/>
           <a:p>
             <a:r>
-              <a:rPr lang="en-US" b="1" dirty="0"/>
+              <a:rPr lang="en-US" sz="1400" b="1" dirty="0"/>
               <a:t>p</a:t>
             </a:r>
             <a:r>
-              <a:rPr lang="en-US" b="1" dirty="0" smtClean="0"/>
+              <a:rPr lang="en-US" sz="1400" b="1" dirty="0" smtClean="0"/>
               <a:t>rojects schema</a:t>
             </a:r>
           </a:p>
           <a:p>
             <a:r>
-              <a:rPr lang="en-US" smtClean="0"/>
+              <a:rPr lang="en-US" sz="1400" dirty="0" smtClean="0"/>
               <a:t>- </a:t>
             </a:r>
             <a:r>
-              <a:rPr lang="en-US" smtClean="0"/>
+              <a:rPr lang="en-US" sz="1400" dirty="0" smtClean="0"/>
               <a:t>name</a:t>
             </a:r>
             <a:r>
-              <a:rPr lang="en-US" dirty="0" smtClean="0"/>
+              <a:rPr lang="en-US" sz="1400" dirty="0" smtClean="0"/>
               <a:t>: string</a:t>
             </a:r>
           </a:p>
           <a:p>
             <a:r>
-              <a:rPr lang="en-US" dirty="0" smtClean="0">
+              <a:rPr lang="en-US" sz="1400" dirty="0" smtClean="0">
                 <a:solidFill>
                   <a:schemeClr val="tx1">
                     <a:lumMod val="95000"/>
@@ -3863,7 +3863,7 @@
               <a:t>- </a:t>
             </a:r>
             <a:r>
-              <a:rPr lang="en-US" dirty="0" smtClean="0">
+              <a:rPr lang="en-US" sz="1400" dirty="0" smtClean="0">
                 <a:solidFill>
                   <a:schemeClr val="tx1">
                     <a:lumMod val="95000"/>
@@ -3873,11 +3873,11 @@
               </a:rPr>
               <a:t>description: string</a:t>
             </a:r>
-            <a:endParaRPr lang="en-US" dirty="0" smtClean="0"/>
-          </a:p>
-          <a:p>
-            <a:r>
-              <a:rPr lang="en-US" dirty="0" smtClean="0">
+            <a:endParaRPr lang="en-US" sz="1400" dirty="0" smtClean="0"/>
+          </a:p>
+          <a:p>
+            <a:r>
+              <a:rPr lang="en-US" sz="1400" dirty="0" smtClean="0">
                 <a:solidFill>
                   <a:srgbClr val="FF0000"/>
                 </a:solidFill>
@@ -3885,7 +3885,7 @@
               <a:t>- </a:t>
             </a:r>
             <a:r>
-              <a:rPr lang="en-US" dirty="0" err="1" smtClean="0">
+              <a:rPr lang="en-US" sz="1400" dirty="0" err="1" smtClean="0">
                 <a:solidFill>
                   <a:schemeClr val="tx1">
                     <a:lumMod val="95000"/>
@@ -3896,7 +3896,7 @@
               <a:t>comment:string</a:t>
             </a:r>
             <a:r>
-              <a:rPr lang="en-US" dirty="0" smtClean="0">
+              <a:rPr lang="en-US" sz="1400" dirty="0" smtClean="0">
                 <a:solidFill>
                   <a:schemeClr val="tx1">
                     <a:lumMod val="95000"/>
@@ -3907,7 +3907,7 @@
               <a:t>  (if edit, should leave </a:t>
             </a:r>
             <a:r>
-              <a:rPr lang="en-US" dirty="0" smtClean="0">
+              <a:rPr lang="en-US" sz="1400" dirty="0" smtClean="0">
                 <a:solidFill>
                   <a:schemeClr val="tx1">
                     <a:lumMod val="95000"/>
@@ -3920,7 +3920,7 @@
           </a:p>
           <a:p>
             <a:r>
-              <a:rPr lang="en-US" dirty="0" smtClean="0">
+              <a:rPr lang="en-US" sz="1400" dirty="0" smtClean="0">
                 <a:solidFill>
                   <a:schemeClr val="tx1">
                     <a:lumMod val="95000"/>
@@ -3931,7 +3931,7 @@
               <a:t>- </a:t>
             </a:r>
             <a:r>
-              <a:rPr lang="en-US" dirty="0" err="1" smtClean="0">
+              <a:rPr lang="en-US" sz="1400" dirty="0" err="1" smtClean="0">
                 <a:solidFill>
                   <a:schemeClr val="tx1">
                     <a:lumMod val="95000"/>
@@ -3942,7 +3942,7 @@
               <a:t>catergory</a:t>
             </a:r>
             <a:r>
-              <a:rPr lang="en-US" dirty="0" smtClean="0">
+              <a:rPr lang="en-US" sz="1400" dirty="0" smtClean="0">
                 <a:solidFill>
                   <a:schemeClr val="tx1">
                     <a:lumMod val="95000"/>
@@ -3952,6 +3952,128 @@
               </a:rPr>
               <a:t>: string</a:t>
             </a:r>
+            <a:endParaRPr lang="en-US" sz="1400" dirty="0" smtClean="0">
+              <a:solidFill>
+                <a:schemeClr val="tx1">
+                  <a:lumMod val="95000"/>
+                  <a:lumOff val="5000"/>
+                </a:schemeClr>
+              </a:solidFill>
+            </a:endParaRPr>
+          </a:p>
+          <a:p>
+            <a:r>
+              <a:rPr lang="en-US" sz="1400" dirty="0" smtClean="0">
+                <a:solidFill>
+                  <a:schemeClr val="tx1">
+                    <a:lumMod val="95000"/>
+                    <a:lumOff val="5000"/>
+                  </a:schemeClr>
+                </a:solidFill>
+              </a:rPr>
+              <a:t>-</a:t>
+            </a:r>
+            <a:r>
+              <a:rPr lang="en-US" sz="1400" dirty="0" err="1" smtClean="0">
+                <a:solidFill>
+                  <a:schemeClr val="tx1">
+                    <a:lumMod val="95000"/>
+                    <a:lumOff val="5000"/>
+                  </a:schemeClr>
+                </a:solidFill>
+              </a:rPr>
+              <a:t>is_shared</a:t>
+            </a:r>
+            <a:r>
+              <a:rPr lang="en-US" sz="1400" dirty="0" smtClean="0">
+                <a:solidFill>
+                  <a:schemeClr val="tx1">
+                    <a:lumMod val="95000"/>
+                    <a:lumOff val="5000"/>
+                  </a:schemeClr>
+                </a:solidFill>
+              </a:rPr>
+              <a:t>: false // </a:t>
+            </a:r>
+            <a:r>
+              <a:rPr lang="en-US" sz="1400" dirty="0" err="1" smtClean="0">
+                <a:solidFill>
+                  <a:schemeClr val="tx1">
+                    <a:lumMod val="95000"/>
+                    <a:lumOff val="5000"/>
+                  </a:schemeClr>
+                </a:solidFill>
+              </a:rPr>
+              <a:t>boolean</a:t>
+            </a:r>
+            <a:endParaRPr lang="en-US" sz="1400" dirty="0">
+              <a:solidFill>
+                <a:schemeClr val="tx1">
+                  <a:lumMod val="95000"/>
+                  <a:lumOff val="5000"/>
+                </a:schemeClr>
+              </a:solidFill>
+            </a:endParaRPr>
+          </a:p>
+          <a:p>
+            <a:r>
+              <a:rPr lang="en-US" sz="1400" dirty="0" smtClean="0"/>
+              <a:t>-</a:t>
+            </a:r>
+            <a:r>
+              <a:rPr lang="en-US" sz="1400" dirty="0" err="1" smtClean="0">
+                <a:solidFill>
+                  <a:srgbClr val="FF0000"/>
+                </a:solidFill>
+              </a:rPr>
+              <a:t>feature_</a:t>
+            </a:r>
+            <a:r>
+              <a:rPr lang="en-US" sz="1400" dirty="0" err="1" smtClean="0">
+                <a:solidFill>
+                  <a:srgbClr val="FF0000"/>
+                </a:solidFill>
+              </a:rPr>
+              <a:t>id</a:t>
+            </a:r>
+            <a:r>
+              <a:rPr lang="en-US" sz="1400" dirty="0" smtClean="0">
+                <a:solidFill>
+                  <a:srgbClr val="FF0000"/>
+                </a:solidFill>
+              </a:rPr>
+              <a:t>: integer // many </a:t>
+            </a:r>
+            <a:endParaRPr lang="en-US" sz="1400" dirty="0" smtClean="0">
+              <a:solidFill>
+                <a:srgbClr val="FF0000"/>
+              </a:solidFill>
+            </a:endParaRPr>
+          </a:p>
+          <a:p>
+            <a:r>
+              <a:rPr lang="en-US" sz="1400" dirty="0" smtClean="0">
+                <a:solidFill>
+                  <a:srgbClr val="FF0000"/>
+                </a:solidFill>
+              </a:rPr>
+              <a:t>-</a:t>
+            </a:r>
+            <a:r>
+              <a:rPr lang="en-US" sz="1400" dirty="0" err="1" smtClean="0">
+                <a:solidFill>
+                  <a:srgbClr val="FF0000"/>
+                </a:solidFill>
+              </a:rPr>
+              <a:t>user_id</a:t>
+            </a:r>
+            <a:endParaRPr lang="en-US" sz="1400" dirty="0" smtClean="0">
+              <a:solidFill>
+                <a:srgbClr val="FF0000"/>
+              </a:solidFill>
+            </a:endParaRPr>
+          </a:p>
+          <a:p>
             <a:endParaRPr lang="en-US" dirty="0" smtClean="0">
               <a:solidFill>
                 <a:schemeClr val="tx1">
@@ -3962,50 +4084,6 @@
             </a:endParaRPr>
           </a:p>
           <a:p>
-            <a:r>
-              <a:rPr lang="en-US" dirty="0" smtClean="0">
-                <a:solidFill>
-                  <a:schemeClr val="tx1">
-                    <a:lumMod val="95000"/>
-                    <a:lumOff val="5000"/>
-                  </a:schemeClr>
-                </a:solidFill>
-              </a:rPr>
-              <a:t>-</a:t>
-            </a:r>
-            <a:r>
-              <a:rPr lang="en-US" dirty="0" err="1" smtClean="0">
-                <a:solidFill>
-                  <a:schemeClr val="tx1">
-                    <a:lumMod val="95000"/>
-                    <a:lumOff val="5000"/>
-                  </a:schemeClr>
-                </a:solidFill>
-              </a:rPr>
-              <a:t>is_shared</a:t>
-            </a:r>
-            <a:r>
-              <a:rPr lang="en-US" dirty="0" smtClean="0">
-                <a:solidFill>
-                  <a:schemeClr val="tx1">
-                    <a:lumMod val="95000"/>
-                    <a:lumOff val="5000"/>
-                  </a:schemeClr>
-                </a:solidFill>
-              </a:rPr>
-              <a:t>: false // </a:t>
-            </a:r>
-            <a:r>
-              <a:rPr lang="en-US" dirty="0" err="1" smtClean="0">
-                <a:solidFill>
-                  <a:schemeClr val="tx1">
-                    <a:lumMod val="95000"/>
-                    <a:lumOff val="5000"/>
-                  </a:schemeClr>
-                </a:solidFill>
-              </a:rPr>
-              <a:t>boolean</a:t>
-            </a:r>
             <a:endParaRPr lang="en-US" dirty="0">
               <a:solidFill>
                 <a:schemeClr val="tx1">
@@ -4015,72 +4093,6 @@
               </a:solidFill>
             </a:endParaRPr>
           </a:p>
-          <a:p>
-            <a:r>
-              <a:rPr lang="en-US" dirty="0" smtClean="0"/>
-              <a:t>-</a:t>
-            </a:r>
-            <a:r>
-              <a:rPr lang="en-US" dirty="0" err="1" smtClean="0">
-                <a:solidFill>
-                  <a:srgbClr val="FF0000"/>
-                </a:solidFill>
-              </a:rPr>
-              <a:t>ersi</a:t>
-            </a:r>
-            <a:r>
-              <a:rPr lang="en-US" dirty="0" smtClean="0">
-                <a:solidFill>
-                  <a:srgbClr val="FF0000"/>
-                </a:solidFill>
-              </a:rPr>
-              <a:t> </a:t>
-            </a:r>
-            <a:r>
-              <a:rPr lang="en-US" dirty="0" err="1" smtClean="0">
-                <a:solidFill>
-                  <a:srgbClr val="FF0000"/>
-                </a:solidFill>
-              </a:rPr>
-              <a:t>webservice</a:t>
-            </a:r>
-            <a:r>
-              <a:rPr lang="en-US" dirty="0">
-                <a:solidFill>
-                  <a:srgbClr val="FF0000"/>
-                </a:solidFill>
-              </a:rPr>
-              <a:t> </a:t>
-            </a:r>
-            <a:r>
-              <a:rPr lang="en-US" dirty="0" smtClean="0">
-                <a:solidFill>
-                  <a:srgbClr val="FF0000"/>
-                </a:solidFill>
-              </a:rPr>
-              <a:t>id: integer // many </a:t>
-            </a:r>
-          </a:p>
-          <a:p>
-            <a:endParaRPr lang="en-US" dirty="0" smtClean="0">
-              <a:solidFill>
-                <a:schemeClr val="tx1">
-                  <a:lumMod val="95000"/>
-                  <a:lumOff val="5000"/>
-                </a:schemeClr>
-              </a:solidFill>
-            </a:endParaRPr>
-          </a:p>
-          <a:p>
-            <a:endParaRPr lang="en-US" dirty="0">
-              <a:solidFill>
-                <a:schemeClr val="tx1">
-                  <a:lumMod val="95000"/>
-                  <a:lumOff val="5000"/>
-                </a:schemeClr>
-              </a:solidFill>
-            </a:endParaRPr>
-          </a:p>
         </p:txBody>
       </p:sp>
       <p:sp>
@@ -4091,8 +4103,8 @@
         </p:nvSpPr>
         <p:spPr>
           <a:xfrm>
-            <a:off x="4063039" y="4248279"/>
-            <a:ext cx="4790038" cy="1754326"/>
+            <a:off x="4012239" y="4786759"/>
+            <a:ext cx="4085281" cy="1754326"/>
           </a:xfrm>
           <a:prstGeom prst="rect">
             <a:avLst/>
@@ -4111,14 +4123,6 @@
           <a:lstStyle/>
           <a:p>
             <a:r>
-              <a:rPr lang="en-US" b="1" dirty="0" err="1" smtClean="0"/>
-              <a:t>Esri</a:t>
-            </a:r>
-            <a:r>
-              <a:rPr lang="en-US" b="1" dirty="0" smtClean="0"/>
-              <a:t> </a:t>
-            </a:r>
-            <a:r>
               <a:rPr lang="en-US" b="1" dirty="0" smtClean="0"/>
               <a:t>Feature schema</a:t>
             </a:r>
@@ -4175,6 +4179,14 @@
             <a:r>
               <a:rPr lang="en-US" dirty="0" smtClean="0"/>
               <a:t>-</a:t>
+            </a:r>
+            <a:r>
+              <a:rPr lang="en-US" b="1" dirty="0" err="1" smtClean="0">
+                <a:solidFill>
+                  <a:srgbClr val="FF0000"/>
+                </a:solidFill>
+              </a:rPr>
+              <a:t>project_id</a:t>
             </a:r>
             <a:r>
               <a:rPr lang="en-US" b="1" dirty="0" smtClean="0">
@@ -4182,15 +4194,7 @@
                   <a:srgbClr val="FF0000"/>
                 </a:solidFill>
               </a:rPr>
-              <a:t>project </a:t>
-            </a:r>
-            <a:r>
-              <a:rPr lang="en-US" b="1" dirty="0" smtClean="0">
-                <a:solidFill>
-                  <a:srgbClr val="FF0000"/>
-                </a:solidFill>
-              </a:rPr>
-              <a:t>id: integer // many</a:t>
+              <a:t>: integer // many</a:t>
             </a:r>
           </a:p>
           <a:p>
@@ -4210,8 +4214,8 @@
         </p:nvSpPr>
         <p:spPr>
           <a:xfrm>
-            <a:off x="96396" y="4805680"/>
-            <a:ext cx="3469709" cy="1754326"/>
+            <a:off x="96397" y="4714240"/>
+            <a:ext cx="2758564" cy="1477328"/>
           </a:xfrm>
           <a:prstGeom prst="rect">
             <a:avLst/>
@@ -4230,164 +4234,47 @@
           <a:lstStyle/>
           <a:p>
             <a:r>
-              <a:rPr lang="en-US" b="1" dirty="0" smtClean="0"/>
+              <a:rPr lang="en-US" b="1" dirty="0" smtClean="0">
+                <a:solidFill>
+                  <a:srgbClr val="0070C0"/>
+                </a:solidFill>
+              </a:rPr>
               <a:t>Public schema</a:t>
             </a:r>
           </a:p>
           <a:p>
             <a:r>
-              <a:rPr lang="en-US" dirty="0" smtClean="0"/>
-              <a:t>-username: string</a:t>
-            </a:r>
-          </a:p>
-          <a:p>
-            <a:r>
-              <a:rPr lang="en-US" dirty="0" smtClean="0"/>
-              <a:t>-name: string</a:t>
-            </a:r>
-          </a:p>
-          <a:p>
-            <a:r>
-              <a:rPr lang="en-US" dirty="0" smtClean="0"/>
-              <a:t>-</a:t>
+              <a:rPr lang="en-US" dirty="0" smtClean="0">
+                <a:solidFill>
+                  <a:srgbClr val="0070C0"/>
+                </a:solidFill>
+              </a:rPr>
+              <a:t>-remove this schema since Project schema can be shared with "</a:t>
             </a:r>
             <a:r>
               <a:rPr lang="en-US" dirty="0" err="1" smtClean="0">
                 <a:solidFill>
-                  <a:srgbClr val="FF0000"/>
+                  <a:srgbClr val="0070C0"/>
                 </a:solidFill>
               </a:rPr>
-              <a:t>projects_id</a:t>
-            </a:r>
-            <a:r>
-              <a:rPr lang="en-US" dirty="0" smtClean="0"/>
-              <a:t>: integer  // project </a:t>
-            </a:r>
-            <a:r>
-              <a:rPr lang="en-US" dirty="0" smtClean="0"/>
-              <a:t>id</a:t>
-            </a:r>
-          </a:p>
-          <a:p>
-            <a:r>
-              <a:rPr lang="en-US" dirty="0" smtClean="0"/>
-              <a:t>-</a:t>
-            </a:r>
-            <a:r>
-              <a:rPr lang="en-US" dirty="0" err="1" smtClean="0"/>
-              <a:t>user_id</a:t>
-            </a:r>
-            <a:r>
-              <a:rPr lang="en-US" dirty="0" smtClean="0"/>
-              <a:t> : integer</a:t>
-            </a:r>
-            <a:endParaRPr lang="en-US" dirty="0" smtClean="0"/>
-          </a:p>
-          <a:p>
-            <a:endParaRPr lang="en-US" dirty="0"/>
-          </a:p>
-        </p:txBody>
-      </p:sp>
-      <p:cxnSp>
-        <p:nvCxnSpPr>
-          <p:cNvPr id="10" name="Straight Arrow Connector 9"/>
-          <p:cNvCxnSpPr/>
-          <p:nvPr/>
-        </p:nvCxnSpPr>
-        <p:spPr>
-          <a:xfrm flipV="1">
-            <a:off x="6725920" y="3505200"/>
-            <a:ext cx="2045877" cy="2621280"/>
-          </a:xfrm>
-          <a:prstGeom prst="straightConnector1">
-            <a:avLst/>
-          </a:prstGeom>
-          <a:ln>
-            <a:headEnd type="triangle"/>
-            <a:tailEnd type="triangle"/>
-          </a:ln>
-        </p:spPr>
-        <p:style>
-          <a:lnRef idx="1">
-            <a:schemeClr val="accent1"/>
-          </a:lnRef>
-          <a:fillRef idx="0">
-            <a:schemeClr val="accent1"/>
-          </a:fillRef>
-          <a:effectRef idx="0">
-            <a:schemeClr val="accent1"/>
-          </a:effectRef>
-          <a:fontRef idx="minor">
-            <a:schemeClr val="tx1"/>
-          </a:fontRef>
-        </p:style>
-      </p:cxnSp>
-      <p:cxnSp>
-        <p:nvCxnSpPr>
-          <p:cNvPr id="12" name="Straight Arrow Connector 11"/>
-          <p:cNvCxnSpPr/>
-          <p:nvPr/>
-        </p:nvCxnSpPr>
-        <p:spPr>
-          <a:xfrm flipH="1" flipV="1">
-            <a:off x="3017520" y="2448560"/>
-            <a:ext cx="4866640" cy="833120"/>
-          </a:xfrm>
-          <a:prstGeom prst="straightConnector1">
-            <a:avLst/>
-          </a:prstGeom>
-          <a:ln>
-            <a:tailEnd type="triangle"/>
-          </a:ln>
-        </p:spPr>
-        <p:style>
-          <a:lnRef idx="1">
-            <a:schemeClr val="accent1"/>
-          </a:lnRef>
-          <a:fillRef idx="0">
-            <a:schemeClr val="accent1"/>
-          </a:fillRef>
-          <a:effectRef idx="0">
-            <a:schemeClr val="accent1"/>
-          </a:effectRef>
-          <a:fontRef idx="minor">
-            <a:schemeClr val="tx1"/>
-          </a:fontRef>
-        </p:style>
-      </p:cxnSp>
-      <p:cxnSp>
-        <p:nvCxnSpPr>
-          <p:cNvPr id="14" name="Straight Arrow Connector 13"/>
-          <p:cNvCxnSpPr/>
-          <p:nvPr/>
-        </p:nvCxnSpPr>
-        <p:spPr>
-          <a:xfrm flipH="1">
-            <a:off x="1432560" y="3505200"/>
-            <a:ext cx="6451600" cy="2194560"/>
-          </a:xfrm>
-          <a:prstGeom prst="straightConnector1">
-            <a:avLst/>
-          </a:prstGeom>
-          <a:ln>
-            <a:tailEnd type="triangle"/>
-          </a:ln>
-        </p:spPr>
-        <p:style>
-          <a:lnRef idx="1">
-            <a:schemeClr val="accent1"/>
-          </a:lnRef>
-          <a:fillRef idx="0">
-            <a:schemeClr val="accent1"/>
-          </a:fillRef>
-          <a:effectRef idx="0">
-            <a:schemeClr val="accent1"/>
-          </a:effectRef>
-          <a:fontRef idx="minor">
-            <a:schemeClr val="tx1"/>
-          </a:fontRef>
-        </p:style>
-      </p:cxnSp>
+              <a:t>is_shared</a:t>
+            </a:r>
+            <a:r>
+              <a:rPr lang="en-US" dirty="0" smtClean="0">
+                <a:solidFill>
+                  <a:srgbClr val="0070C0"/>
+                </a:solidFill>
+              </a:rPr>
+              <a:t>" if set to TRUE</a:t>
+            </a:r>
+            <a:endParaRPr lang="en-US" dirty="0">
+              <a:solidFill>
+                <a:srgbClr val="0070C0"/>
+              </a:solidFill>
+            </a:endParaRPr>
+          </a:p>
+        </p:txBody>
+      </p:sp>
     </p:spTree>
     <p:extLst>
       <p:ext uri="{BB962C8B-B14F-4D97-AF65-F5344CB8AC3E}">

</xml_diff>

<commit_message>
create/log user valida completed
</commit_message>
<xml_diff>
--- a/Geospatial Online Project.pptx
+++ b/Geospatial Online Project.pptx
@@ -4275,6 +4275,196 @@
           </a:p>
         </p:txBody>
       </p:sp>
+      <p:sp>
+        <p:nvSpPr>
+          <p:cNvPr id="19" name="TextBox 18"/>
+          <p:cNvSpPr txBox="1"/>
+          <p:nvPr/>
+        </p:nvSpPr>
+        <p:spPr>
+          <a:xfrm>
+            <a:off x="2955236" y="2570922"/>
+            <a:ext cx="3458816" cy="1200329"/>
+          </a:xfrm>
+          <a:prstGeom prst="rect">
+            <a:avLst/>
+          </a:prstGeom>
+          <a:noFill/>
+          <a:ln>
+            <a:solidFill>
+              <a:srgbClr val="FF0000"/>
+            </a:solidFill>
+          </a:ln>
+        </p:spPr>
+        <p:txBody>
+          <a:bodyPr wrap="square" rtlCol="0">
+            <a:spAutoFit/>
+          </a:bodyPr>
+          <a:lstStyle/>
+          <a:p>
+            <a:r>
+              <a:rPr lang="en-US" dirty="0" smtClean="0">
+                <a:solidFill>
+                  <a:srgbClr val="0070C0"/>
+                </a:solidFill>
+              </a:rPr>
+              <a:t>Controller schema</a:t>
+            </a:r>
+          </a:p>
+          <a:p>
+            <a:r>
+              <a:rPr lang="en-US" dirty="0" smtClean="0">
+                <a:solidFill>
+                  <a:srgbClr val="0070C0"/>
+                </a:solidFill>
+              </a:rPr>
+              <a:t>- </a:t>
+            </a:r>
+            <a:r>
+              <a:rPr lang="en-US" dirty="0" err="1" smtClean="0">
+                <a:solidFill>
+                  <a:srgbClr val="0070C0"/>
+                </a:solidFill>
+              </a:rPr>
+              <a:t>project_id</a:t>
+            </a:r>
+            <a:endParaRPr lang="en-US" dirty="0" smtClean="0">
+              <a:solidFill>
+                <a:srgbClr val="0070C0"/>
+              </a:solidFill>
+            </a:endParaRPr>
+          </a:p>
+          <a:p>
+            <a:r>
+              <a:rPr lang="en-US" dirty="0" smtClean="0">
+                <a:solidFill>
+                  <a:srgbClr val="0070C0"/>
+                </a:solidFill>
+              </a:rPr>
+              <a:t>- </a:t>
+            </a:r>
+            <a:r>
+              <a:rPr lang="en-US" dirty="0" err="1" smtClean="0">
+                <a:solidFill>
+                  <a:srgbClr val="0070C0"/>
+                </a:solidFill>
+              </a:rPr>
+              <a:t>feature_id</a:t>
+            </a:r>
+            <a:endParaRPr lang="en-US" dirty="0" smtClean="0">
+              <a:solidFill>
+                <a:srgbClr val="0070C0"/>
+              </a:solidFill>
+            </a:endParaRPr>
+          </a:p>
+          <a:p>
+            <a:endParaRPr lang="en-US" dirty="0">
+              <a:solidFill>
+                <a:srgbClr val="0070C0"/>
+              </a:solidFill>
+            </a:endParaRPr>
+          </a:p>
+        </p:txBody>
+      </p:sp>
+      <p:cxnSp>
+        <p:nvCxnSpPr>
+          <p:cNvPr id="21" name="Straight Arrow Connector 20"/>
+          <p:cNvCxnSpPr/>
+          <p:nvPr/>
+        </p:nvCxnSpPr>
+        <p:spPr>
+          <a:xfrm flipH="1">
+            <a:off x="4121426" y="1258957"/>
+            <a:ext cx="3742414" cy="1762539"/>
+          </a:xfrm>
+          <a:prstGeom prst="straightConnector1">
+            <a:avLst/>
+          </a:prstGeom>
+          <a:ln>
+            <a:tailEnd type="triangle"/>
+          </a:ln>
+        </p:spPr>
+        <p:style>
+          <a:lnRef idx="1">
+            <a:schemeClr val="accent1"/>
+          </a:lnRef>
+          <a:fillRef idx="0">
+            <a:schemeClr val="accent1"/>
+          </a:fillRef>
+          <a:effectRef idx="0">
+            <a:schemeClr val="accent1"/>
+          </a:effectRef>
+          <a:fontRef idx="minor">
+            <a:schemeClr val="tx1"/>
+          </a:fontRef>
+        </p:style>
+      </p:cxnSp>
+      <p:cxnSp>
+        <p:nvCxnSpPr>
+          <p:cNvPr id="24" name="Straight Arrow Connector 23"/>
+          <p:cNvCxnSpPr/>
+          <p:nvPr/>
+        </p:nvCxnSpPr>
+        <p:spPr>
+          <a:xfrm flipH="1" flipV="1">
+            <a:off x="3260035" y="3352800"/>
+            <a:ext cx="861391" cy="1433959"/>
+          </a:xfrm>
+          <a:prstGeom prst="straightConnector1">
+            <a:avLst/>
+          </a:prstGeom>
+          <a:ln>
+            <a:tailEnd type="triangle"/>
+          </a:ln>
+        </p:spPr>
+        <p:style>
+          <a:lnRef idx="1">
+            <a:schemeClr val="accent1"/>
+          </a:lnRef>
+          <a:fillRef idx="0">
+            <a:schemeClr val="accent1"/>
+          </a:fillRef>
+          <a:effectRef idx="0">
+            <a:schemeClr val="accent1"/>
+          </a:effectRef>
+          <a:fontRef idx="minor">
+            <a:schemeClr val="tx1"/>
+          </a:fontRef>
+        </p:style>
+      </p:cxnSp>
+      <p:cxnSp>
+        <p:nvCxnSpPr>
+          <p:cNvPr id="27" name="Straight Arrow Connector 26"/>
+          <p:cNvCxnSpPr/>
+          <p:nvPr/>
+        </p:nvCxnSpPr>
+        <p:spPr>
+          <a:xfrm flipH="1" flipV="1">
+            <a:off x="2544417" y="1555414"/>
+            <a:ext cx="5319424" cy="1187786"/>
+          </a:xfrm>
+          <a:prstGeom prst="straightConnector1">
+            <a:avLst/>
+          </a:prstGeom>
+          <a:ln>
+            <a:tailEnd type="triangle"/>
+          </a:ln>
+        </p:spPr>
+        <p:style>
+          <a:lnRef idx="1">
+            <a:schemeClr val="accent1"/>
+          </a:lnRef>
+          <a:fillRef idx="0">
+            <a:schemeClr val="accent1"/>
+          </a:fillRef>
+          <a:effectRef idx="0">
+            <a:schemeClr val="accent1"/>
+          </a:effectRef>
+          <a:fontRef idx="minor">
+            <a:schemeClr val="tx1"/>
+          </a:fontRef>
+        </p:style>
+      </p:cxnSp>
     </p:spTree>
     <p:extLst>
       <p:ext uri="{BB962C8B-B14F-4D97-AF65-F5344CB8AC3E}">

</xml_diff>

<commit_message>
changed in schema design
</commit_message>
<xml_diff>
--- a/Geospatial Online Project.pptx
+++ b/Geospatial Online Project.pptx
@@ -470,6 +470,90 @@
 </file>
 
 <file path=ppt/notesSlides/notesSlide1.xml><?xml version="1.0" encoding="utf-8"?>
+<p:notes xmlns:a="http://schemas.openxmlformats.org/drawingml/2006/main" xmlns:r="http://schemas.openxmlformats.org/officeDocument/2006/relationships" xmlns:p="http://schemas.openxmlformats.org/presentationml/2006/main">
+  <p:cSld>
+    <p:spTree>
+      <p:nvGrpSpPr>
+        <p:cNvPr id="1" name=""/>
+        <p:cNvGrpSpPr/>
+        <p:nvPr/>
+      </p:nvGrpSpPr>
+      <p:grpSpPr>
+        <a:xfrm>
+          <a:off x="0" y="0"/>
+          <a:ext cx="0" cy="0"/>
+          <a:chOff x="0" y="0"/>
+          <a:chExt cx="0" cy="0"/>
+        </a:xfrm>
+      </p:grpSpPr>
+      <p:sp>
+        <p:nvSpPr>
+          <p:cNvPr id="2" name="Slide Image Placeholder 1"/>
+          <p:cNvSpPr>
+            <a:spLocks noGrp="1" noRot="1" noChangeAspect="1"/>
+          </p:cNvSpPr>
+          <p:nvPr>
+            <p:ph type="sldImg"/>
+          </p:nvPr>
+        </p:nvSpPr>
+        <p:spPr/>
+      </p:sp>
+      <p:sp>
+        <p:nvSpPr>
+          <p:cNvPr id="3" name="Notes Placeholder 2"/>
+          <p:cNvSpPr>
+            <a:spLocks noGrp="1"/>
+          </p:cNvSpPr>
+          <p:nvPr>
+            <p:ph type="body" idx="1"/>
+          </p:nvPr>
+        </p:nvSpPr>
+        <p:spPr/>
+        <p:txBody>
+          <a:bodyPr/>
+          <a:lstStyle/>
+          <a:p>
+            <a:endParaRPr lang="en-US" dirty="0"/>
+          </a:p>
+        </p:txBody>
+      </p:sp>
+      <p:sp>
+        <p:nvSpPr>
+          <p:cNvPr id="4" name="Slide Number Placeholder 3"/>
+          <p:cNvSpPr>
+            <a:spLocks noGrp="1"/>
+          </p:cNvSpPr>
+          <p:nvPr>
+            <p:ph type="sldNum" sz="quarter" idx="10"/>
+          </p:nvPr>
+        </p:nvSpPr>
+        <p:spPr/>
+        <p:txBody>
+          <a:bodyPr/>
+          <a:lstStyle/>
+          <a:p>
+            <a:fld id="{925689F2-BBCC-4249-A1C0-857DB06C99E6}" type="slidenum">
+              <a:rPr lang="en-US" smtClean="0"/>
+              <a:t>4</a:t>
+            </a:fld>
+            <a:endParaRPr lang="en-US"/>
+          </a:p>
+        </p:txBody>
+      </p:sp>
+    </p:spTree>
+    <p:extLst>
+      <p:ext uri="{BB962C8B-B14F-4D97-AF65-F5344CB8AC3E}">
+        <p14:creationId xmlns:p14="http://schemas.microsoft.com/office/powerpoint/2010/main" val="723956053"/>
+      </p:ext>
+    </p:extLst>
+  </p:cSld>
+  <p:clrMapOvr>
+    <a:masterClrMapping/>
+  </p:clrMapOvr>
+</p:notes>
+</file>
+
+<file path=ppt/notesSlides/notesSlide2.xml><?xml version="1.0" encoding="utf-8"?>
 <p:notes xmlns:a="http://schemas.openxmlformats.org/drawingml/2006/main" xmlns:r="http://schemas.openxmlformats.org/officeDocument/2006/relationships" xmlns:p="http://schemas.openxmlformats.org/presentationml/2006/main">
   <p:cSld>
     <p:spTree>
@@ -3808,7 +3892,7 @@
         </p:nvSpPr>
         <p:spPr>
           <a:xfrm>
-            <a:off x="7863840" y="1076959"/>
+            <a:off x="7863840" y="1143522"/>
             <a:ext cx="4123721" cy="2369880"/>
           </a:xfrm>
           <a:prstGeom prst="rect">
@@ -4103,7 +4187,7 @@
         </p:nvSpPr>
         <p:spPr>
           <a:xfrm>
-            <a:off x="4012239" y="4786759"/>
+            <a:off x="3949992" y="4786759"/>
             <a:ext cx="4085281" cy="1754326"/>
           </a:xfrm>
           <a:prstGeom prst="rect">
@@ -4214,8 +4298,8 @@
         </p:nvSpPr>
         <p:spPr>
           <a:xfrm>
-            <a:off x="96397" y="4714240"/>
-            <a:ext cx="2758564" cy="1477328"/>
+            <a:off x="96397" y="5075582"/>
+            <a:ext cx="2120709" cy="2031325"/>
           </a:xfrm>
           <a:prstGeom prst="rect">
             <a:avLst/>
@@ -4283,8 +4367,8 @@
         </p:nvSpPr>
         <p:spPr>
           <a:xfrm>
-            <a:off x="2955236" y="2570922"/>
-            <a:ext cx="3458816" cy="1200329"/>
+            <a:off x="2661920" y="2570922"/>
+            <a:ext cx="3752131" cy="1477328"/>
           </a:xfrm>
           <a:prstGeom prst="rect">
             <a:avLst/>
@@ -4351,6 +4435,13 @@
               </a:rPr>
               <a:t>feature_id</a:t>
             </a:r>
+            <a:endParaRPr lang="en-US" dirty="0" smtClean="0">
+              <a:solidFill>
+                <a:srgbClr val="0070C0"/>
+              </a:solidFill>
+            </a:endParaRPr>
+          </a:p>
+          <a:p>
             <a:endParaRPr lang="en-US" dirty="0" smtClean="0">
               <a:solidFill>
                 <a:srgbClr val="0070C0"/>
@@ -4623,14 +4714,14 @@
       </p:grpSpPr>
       <p:sp>
         <p:nvSpPr>
-          <p:cNvPr id="5" name="TextBox 4"/>
+          <p:cNvPr id="9" name="TextBox 8"/>
           <p:cNvSpPr txBox="1"/>
           <p:nvPr/>
         </p:nvSpPr>
         <p:spPr>
           <a:xfrm>
-            <a:off x="248920" y="1102043"/>
-            <a:ext cx="2600960" cy="4927600"/>
+            <a:off x="392938" y="1182480"/>
+            <a:ext cx="11641328" cy="3148060"/>
           </a:xfrm>
           <a:prstGeom prst="rect">
             <a:avLst/>
@@ -4654,14 +4745,14 @@
       </p:sp>
       <p:sp>
         <p:nvSpPr>
-          <p:cNvPr id="7" name="TextBox 6"/>
+          <p:cNvPr id="10" name="TextBox 9"/>
           <p:cNvSpPr txBox="1"/>
           <p:nvPr/>
         </p:nvSpPr>
         <p:spPr>
           <a:xfrm>
-            <a:off x="9392920" y="1249680"/>
-            <a:ext cx="2565400" cy="4927600"/>
+            <a:off x="328676" y="4248757"/>
+            <a:ext cx="11641328" cy="369332"/>
           </a:xfrm>
           <a:prstGeom prst="rect">
             <a:avLst/>
@@ -4679,186 +4770,11 @@
           </a:bodyPr>
           <a:lstStyle/>
           <a:p>
-            <a:endParaRPr lang="en-US"/>
-          </a:p>
-        </p:txBody>
-      </p:sp>
-      <p:sp>
-        <p:nvSpPr>
-          <p:cNvPr id="8" name="TextBox 7"/>
-          <p:cNvSpPr txBox="1"/>
-          <p:nvPr/>
-        </p:nvSpPr>
-        <p:spPr>
-          <a:xfrm>
-            <a:off x="2956560" y="1117600"/>
-            <a:ext cx="6268720" cy="369332"/>
-          </a:xfrm>
-          <a:prstGeom prst="rect">
-            <a:avLst/>
-          </a:prstGeom>
-          <a:noFill/>
-          <a:ln>
-            <a:solidFill>
-              <a:schemeClr val="tx1"/>
-            </a:solidFill>
-          </a:ln>
-        </p:spPr>
-        <p:txBody>
-          <a:bodyPr wrap="square" rtlCol="0">
-            <a:spAutoFit/>
-          </a:bodyPr>
-          <a:lstStyle/>
-          <a:p>
-            <a:r>
-              <a:rPr lang="en-US" dirty="0" smtClean="0"/>
-              <a:t>		MAP SECTION</a:t>
-            </a:r>
-            <a:endParaRPr lang="en-US" dirty="0"/>
-          </a:p>
-        </p:txBody>
-      </p:sp>
-      <p:sp>
-        <p:nvSpPr>
-          <p:cNvPr id="9" name="TextBox 8"/>
-          <p:cNvSpPr txBox="1"/>
-          <p:nvPr/>
-        </p:nvSpPr>
-        <p:spPr>
-          <a:xfrm>
-            <a:off x="2956560" y="1971040"/>
-            <a:ext cx="5811520" cy="3576320"/>
-          </a:xfrm>
-          <a:prstGeom prst="rect">
-            <a:avLst/>
-          </a:prstGeom>
-          <a:noFill/>
-          <a:ln>
-            <a:solidFill>
-              <a:schemeClr val="tx1"/>
-            </a:solidFill>
-          </a:ln>
-        </p:spPr>
-        <p:txBody>
-          <a:bodyPr wrap="square" rtlCol="0">
-            <a:spAutoFit/>
-          </a:bodyPr>
-          <a:lstStyle/>
-          <a:p>
-            <a:endParaRPr lang="en-US"/>
-          </a:p>
-        </p:txBody>
-      </p:sp>
-      <p:sp>
-        <p:nvSpPr>
-          <p:cNvPr id="10" name="TextBox 9"/>
-          <p:cNvSpPr txBox="1"/>
-          <p:nvPr/>
-        </p:nvSpPr>
-        <p:spPr>
-          <a:xfrm>
-            <a:off x="2956560" y="5577840"/>
-            <a:ext cx="6360160" cy="369332"/>
-          </a:xfrm>
-          <a:prstGeom prst="rect">
-            <a:avLst/>
-          </a:prstGeom>
-          <a:noFill/>
-          <a:ln>
-            <a:solidFill>
-              <a:schemeClr val="tx1"/>
-            </a:solidFill>
-          </a:ln>
-        </p:spPr>
-        <p:txBody>
-          <a:bodyPr wrap="square" rtlCol="0">
-            <a:spAutoFit/>
-          </a:bodyPr>
-          <a:lstStyle/>
-          <a:p>
-            <a:r>
-              <a:rPr lang="en-US" smtClean="0"/>
-              <a:t>  			 MAP's TOOLs</a:t>
-            </a:r>
-            <a:endParaRPr lang="en-US"/>
-          </a:p>
-        </p:txBody>
-      </p:sp>
-      <p:sp>
-        <p:nvSpPr>
-          <p:cNvPr id="11" name="TextBox 10"/>
-          <p:cNvSpPr txBox="1"/>
-          <p:nvPr/>
-        </p:nvSpPr>
-        <p:spPr>
-          <a:xfrm>
-            <a:off x="9469120" y="1302266"/>
-            <a:ext cx="2387600" cy="369332"/>
-          </a:xfrm>
-          <a:prstGeom prst="rect">
-            <a:avLst/>
-          </a:prstGeom>
-          <a:noFill/>
-          <a:ln>
-            <a:solidFill>
-              <a:schemeClr val="tx1"/>
-            </a:solidFill>
-          </a:ln>
-        </p:spPr>
-        <p:txBody>
-          <a:bodyPr wrap="square" rtlCol="0">
-            <a:spAutoFit/>
-          </a:bodyPr>
-          <a:lstStyle/>
-          <a:p>
             <a:r>
               <a:rPr lang="en-US" dirty="0" smtClean="0"/>
               <a:t>  </a:t>
             </a:r>
-            <a:r>
-              <a:rPr lang="en-US" sz="1600" dirty="0" smtClean="0"/>
-              <a:t>List of available data API</a:t>
-            </a:r>
-            <a:endParaRPr lang="en-US" sz="1600" dirty="0"/>
-          </a:p>
-        </p:txBody>
-      </p:sp>
-      <p:sp>
-        <p:nvSpPr>
-          <p:cNvPr id="12" name="TextBox 11"/>
-          <p:cNvSpPr txBox="1"/>
-          <p:nvPr/>
-        </p:nvSpPr>
-        <p:spPr>
-          <a:xfrm>
-            <a:off x="467360" y="2641600"/>
-            <a:ext cx="2275840" cy="369332"/>
-          </a:xfrm>
-          <a:prstGeom prst="rect">
-            <a:avLst/>
-          </a:prstGeom>
-          <a:noFill/>
-          <a:ln>
-            <a:solidFill>
-              <a:schemeClr val="tx1"/>
-            </a:solidFill>
-          </a:ln>
-        </p:spPr>
-        <p:txBody>
-          <a:bodyPr wrap="square" rtlCol="0">
-            <a:spAutoFit/>
-          </a:bodyPr>
-          <a:lstStyle/>
-          <a:p>
-            <a:r>
-              <a:rPr lang="en-US" dirty="0" smtClean="0"/>
-              <a:t>  </a:t>
-            </a:r>
-            <a:r>
-              <a:rPr lang="en-US" sz="1600" dirty="0" smtClean="0"/>
-              <a:t>List of existent projects</a:t>
-            </a:r>
-            <a:endParaRPr lang="en-US" sz="1600" dirty="0"/>
+            <a:endParaRPr lang="en-US" dirty="0"/>
           </a:p>
         </p:txBody>
       </p:sp>
@@ -4905,20 +4821,32 @@
           <a:p>
             <a:pPr algn="ctr"/>
             <a:r>
-              <a:rPr lang="en-US" dirty="0" smtClean="0"/>
-              <a:t>FO</a:t>
+              <a:rPr lang="en-US" dirty="0">
+                <a:solidFill>
+                  <a:schemeClr val="tx1"/>
+                </a:solidFill>
+              </a:rPr>
+              <a:t>HOME |  </a:t>
             </a:r>
             <a:r>
               <a:rPr lang="en-US" dirty="0" smtClean="0">
                 <a:solidFill>
-                  <a:schemeClr val="tx1">
-                    <a:lumMod val="75000"/>
-                    <a:lumOff val="25000"/>
-                  </a:schemeClr>
+                  <a:schemeClr val="tx1"/>
                 </a:solidFill>
               </a:rPr>
-              <a:t>FOOTER</a:t>
-            </a:r>
+              <a:t>ESRI | </a:t>
+            </a:r>
+            <a:r>
+              <a:rPr lang="en-US" dirty="0">
+                <a:solidFill>
+                  <a:schemeClr val="tx1"/>
+                </a:solidFill>
+              </a:rPr>
+              <a:t>login/logout</a:t>
+            </a:r>
+          </a:p>
+          <a:p>
+            <a:pPr algn="ctr"/>
             <a:endParaRPr lang="en-US" dirty="0"/>
           </a:p>
         </p:txBody>
@@ -4931,8 +4859,8 @@
         </p:nvSpPr>
         <p:spPr>
           <a:xfrm>
-            <a:off x="558800" y="274320"/>
-            <a:ext cx="11196320" cy="802640"/>
+            <a:off x="355600" y="274320"/>
+            <a:ext cx="11641328" cy="802640"/>
           </a:xfrm>
           <a:prstGeom prst="rect">
             <a:avLst/>
@@ -4971,7 +4899,7 @@
                   <a:schemeClr val="tx1"/>
                 </a:solidFill>
               </a:rPr>
-              <a:t>HEADER</a:t>
+              <a:t>HOME |  MAP | login/logout</a:t>
             </a:r>
             <a:endParaRPr lang="en-US" dirty="0">
               <a:solidFill>
@@ -4983,14 +4911,14 @@
       </p:sp>
       <p:sp>
         <p:nvSpPr>
-          <p:cNvPr id="16" name="TextBox 15"/>
+          <p:cNvPr id="17" name="TextBox 16"/>
           <p:cNvSpPr txBox="1"/>
           <p:nvPr/>
         </p:nvSpPr>
         <p:spPr>
           <a:xfrm>
-            <a:off x="9380220" y="1295400"/>
-            <a:ext cx="2565400" cy="4927600"/>
+            <a:off x="355600" y="4272248"/>
+            <a:ext cx="1546352" cy="307777"/>
           </a:xfrm>
           <a:prstGeom prst="rect">
             <a:avLst/>
@@ -5008,20 +4936,24 @@
           </a:bodyPr>
           <a:lstStyle/>
           <a:p>
-            <a:endParaRPr lang="en-US"/>
-          </a:p>
-        </p:txBody>
-      </p:sp>
-      <p:sp>
-        <p:nvSpPr>
-          <p:cNvPr id="17" name="TextBox 16"/>
+            <a:r>
+              <a:rPr lang="en-US" sz="1400" dirty="0" smtClean="0"/>
+              <a:t>Your projects</a:t>
+            </a:r>
+            <a:endParaRPr lang="en-US" sz="1400" dirty="0"/>
+          </a:p>
+        </p:txBody>
+      </p:sp>
+      <p:sp>
+        <p:nvSpPr>
+          <p:cNvPr id="19" name="TextBox 18"/>
           <p:cNvSpPr txBox="1"/>
           <p:nvPr/>
         </p:nvSpPr>
         <p:spPr>
           <a:xfrm>
-            <a:off x="9519920" y="5721866"/>
-            <a:ext cx="2387600" cy="307777"/>
+            <a:off x="3063240" y="4272248"/>
+            <a:ext cx="1170432" cy="307777"/>
           </a:xfrm>
           <a:prstGeom prst="rect">
             <a:avLst/>
@@ -5040,8 +4972,12 @@
           <a:lstStyle/>
           <a:p>
             <a:r>
+              <a:rPr lang="en-US" sz="1200" dirty="0" smtClean="0"/>
+              <a:t>shared project</a:t>
+            </a:r>
+            <a:r>
               <a:rPr lang="en-US" sz="1400" dirty="0" smtClean="0"/>
-              <a:t>Add data from keyboard</a:t>
+              <a:t> </a:t>
             </a:r>
             <a:endParaRPr lang="en-US" sz="1400" dirty="0"/>
           </a:p>
@@ -5049,18 +4985,124 @@
       </p:sp>
       <p:sp>
         <p:nvSpPr>
-          <p:cNvPr id="2" name="Rectangle 1"/>
-          <p:cNvSpPr/>
+          <p:cNvPr id="21" name="TextBox 20"/>
+          <p:cNvSpPr txBox="1"/>
           <p:nvPr/>
         </p:nvSpPr>
         <p:spPr>
           <a:xfrm>
-            <a:off x="467360" y="1574800"/>
-            <a:ext cx="2225040" cy="802640"/>
+            <a:off x="4645152" y="4753570"/>
+            <a:ext cx="2136140" cy="276999"/>
           </a:xfrm>
           <a:prstGeom prst="rect">
             <a:avLst/>
           </a:prstGeom>
+          <a:noFill/>
+          <a:ln>
+            <a:solidFill>
+              <a:schemeClr val="tx1"/>
+            </a:solidFill>
+          </a:ln>
+        </p:spPr>
+        <p:txBody>
+          <a:bodyPr wrap="square" rtlCol="0">
+            <a:spAutoFit/>
+          </a:bodyPr>
+          <a:lstStyle/>
+          <a:p>
+            <a:r>
+              <a:rPr lang="en-US" sz="1200" dirty="0" smtClean="0"/>
+              <a:t>Available feature service</a:t>
+            </a:r>
+            <a:endParaRPr lang="en-US" sz="1200" dirty="0"/>
+          </a:p>
+        </p:txBody>
+      </p:sp>
+      <p:sp>
+        <p:nvSpPr>
+          <p:cNvPr id="22" name="TextBox 21"/>
+          <p:cNvSpPr txBox="1"/>
+          <p:nvPr/>
+        </p:nvSpPr>
+        <p:spPr>
+          <a:xfrm>
+            <a:off x="7726680" y="4332946"/>
+            <a:ext cx="1388872" cy="276999"/>
+          </a:xfrm>
+          <a:prstGeom prst="rect">
+            <a:avLst/>
+          </a:prstGeom>
+          <a:noFill/>
+          <a:ln>
+            <a:solidFill>
+              <a:schemeClr val="tx1"/>
+            </a:solidFill>
+          </a:ln>
+        </p:spPr>
+        <p:txBody>
+          <a:bodyPr wrap="square" rtlCol="0">
+            <a:spAutoFit/>
+          </a:bodyPr>
+          <a:lstStyle/>
+          <a:p>
+            <a:r>
+              <a:rPr lang="en-US" sz="1200" dirty="0" err="1" smtClean="0"/>
+              <a:t>basemaps</a:t>
+            </a:r>
+            <a:endParaRPr lang="en-US" sz="1200" dirty="0"/>
+          </a:p>
+        </p:txBody>
+      </p:sp>
+      <p:sp>
+        <p:nvSpPr>
+          <p:cNvPr id="23" name="TextBox 22"/>
+          <p:cNvSpPr txBox="1"/>
+          <p:nvPr/>
+        </p:nvSpPr>
+        <p:spPr>
+          <a:xfrm>
+            <a:off x="9217152" y="4332946"/>
+            <a:ext cx="2639568" cy="276999"/>
+          </a:xfrm>
+          <a:prstGeom prst="rect">
+            <a:avLst/>
+          </a:prstGeom>
+          <a:noFill/>
+          <a:ln>
+            <a:solidFill>
+              <a:schemeClr val="tx1"/>
+            </a:solidFill>
+          </a:ln>
+        </p:spPr>
+        <p:txBody>
+          <a:bodyPr wrap="square" rtlCol="0">
+            <a:spAutoFit/>
+          </a:bodyPr>
+          <a:lstStyle/>
+          <a:p>
+            <a:r>
+              <a:rPr lang="en-US" sz="1200" dirty="0" smtClean="0"/>
+              <a:t>Search box</a:t>
+            </a:r>
+            <a:endParaRPr lang="en-US" sz="1200" dirty="0"/>
+          </a:p>
+        </p:txBody>
+      </p:sp>
+      <p:sp>
+        <p:nvSpPr>
+          <p:cNvPr id="4" name="Rectangle 3"/>
+          <p:cNvSpPr/>
+          <p:nvPr/>
+        </p:nvSpPr>
+        <p:spPr>
+          <a:xfrm>
+            <a:off x="328676" y="4727448"/>
+            <a:ext cx="4078732" cy="1347617"/>
+          </a:xfrm>
+          <a:prstGeom prst="rect">
+            <a:avLst/>
+          </a:prstGeom>
+          <a:noFill/>
         </p:spPr>
         <p:style>
           <a:lnRef idx="2">
@@ -5084,10 +5126,186 @@
           <a:p>
             <a:pPr algn="ctr"/>
             <a:r>
-              <a:rPr lang="en-US" dirty="0" smtClean="0"/>
-              <a:t>Show user name</a:t>
-            </a:r>
-            <a:endParaRPr lang="en-US" dirty="0"/>
+              <a:rPr lang="en-US" dirty="0" smtClean="0">
+                <a:solidFill>
+                  <a:schemeClr val="tx1"/>
+                </a:solidFill>
+              </a:rPr>
+              <a:t>profile</a:t>
+            </a:r>
+            <a:endParaRPr lang="en-US" dirty="0">
+              <a:solidFill>
+                <a:schemeClr val="tx1"/>
+              </a:solidFill>
+            </a:endParaRPr>
+          </a:p>
+        </p:txBody>
+      </p:sp>
+      <p:sp>
+        <p:nvSpPr>
+          <p:cNvPr id="25" name="Rectangle 24"/>
+          <p:cNvSpPr/>
+          <p:nvPr/>
+        </p:nvSpPr>
+        <p:spPr>
+          <a:xfrm>
+            <a:off x="4498848" y="4753678"/>
+            <a:ext cx="7357872" cy="1321388"/>
+          </a:xfrm>
+          <a:prstGeom prst="rect">
+            <a:avLst/>
+          </a:prstGeom>
+          <a:noFill/>
+        </p:spPr>
+        <p:style>
+          <a:lnRef idx="2">
+            <a:schemeClr val="accent1">
+              <a:shade val="50000"/>
+            </a:schemeClr>
+          </a:lnRef>
+          <a:fillRef idx="1">
+            <a:schemeClr val="accent1"/>
+          </a:fillRef>
+          <a:effectRef idx="0">
+            <a:schemeClr val="accent1"/>
+          </a:effectRef>
+          <a:fontRef idx="minor">
+            <a:schemeClr val="lt1"/>
+          </a:fontRef>
+        </p:style>
+        <p:txBody>
+          <a:bodyPr rtlCol="0" anchor="ctr"/>
+          <a:lstStyle/>
+          <a:p>
+            <a:pPr algn="ctr"/>
+            <a:r>
+              <a:rPr lang="en-US" dirty="0" smtClean="0">
+                <a:solidFill>
+                  <a:schemeClr val="tx1">
+                    <a:lumMod val="75000"/>
+                    <a:lumOff val="25000"/>
+                  </a:schemeClr>
+                </a:solidFill>
+              </a:rPr>
+              <a:t>Create new/load old  </a:t>
+            </a:r>
+            <a:endParaRPr lang="en-US" dirty="0">
+              <a:solidFill>
+                <a:schemeClr val="tx1">
+                  <a:lumMod val="75000"/>
+                  <a:lumOff val="25000"/>
+                </a:schemeClr>
+              </a:solidFill>
+            </a:endParaRPr>
+          </a:p>
+        </p:txBody>
+      </p:sp>
+      <p:sp>
+        <p:nvSpPr>
+          <p:cNvPr id="26" name="TextBox 25"/>
+          <p:cNvSpPr txBox="1"/>
+          <p:nvPr/>
+        </p:nvSpPr>
+        <p:spPr>
+          <a:xfrm>
+            <a:off x="4301236" y="4315300"/>
+            <a:ext cx="865124" cy="307777"/>
+          </a:xfrm>
+          <a:prstGeom prst="rect">
+            <a:avLst/>
+          </a:prstGeom>
+          <a:noFill/>
+          <a:ln>
+            <a:solidFill>
+              <a:schemeClr val="tx1"/>
+            </a:solidFill>
+          </a:ln>
+        </p:spPr>
+        <p:txBody>
+          <a:bodyPr wrap="square" rtlCol="0">
+            <a:spAutoFit/>
+          </a:bodyPr>
+          <a:lstStyle/>
+          <a:p>
+            <a:r>
+              <a:rPr lang="en-US" sz="1400" dirty="0" smtClean="0"/>
+              <a:t>load </a:t>
+            </a:r>
+            <a:endParaRPr lang="en-US" sz="1400" dirty="0"/>
+          </a:p>
+        </p:txBody>
+      </p:sp>
+      <p:sp>
+        <p:nvSpPr>
+          <p:cNvPr id="27" name="TextBox 26"/>
+          <p:cNvSpPr txBox="1"/>
+          <p:nvPr/>
+        </p:nvSpPr>
+        <p:spPr>
+          <a:xfrm>
+            <a:off x="1969516" y="4330540"/>
+            <a:ext cx="915670" cy="307777"/>
+          </a:xfrm>
+          <a:prstGeom prst="rect">
+            <a:avLst/>
+          </a:prstGeom>
+          <a:noFill/>
+          <a:ln>
+            <a:solidFill>
+              <a:schemeClr val="tx1"/>
+            </a:solidFill>
+          </a:ln>
+        </p:spPr>
+        <p:txBody>
+          <a:bodyPr wrap="square" rtlCol="0">
+            <a:spAutoFit/>
+          </a:bodyPr>
+          <a:lstStyle/>
+          <a:p>
+            <a:r>
+              <a:rPr lang="en-US" sz="1400" dirty="0" smtClean="0"/>
+              <a:t>Load/edit </a:t>
+            </a:r>
+            <a:endParaRPr lang="en-US" sz="1400" dirty="0"/>
+          </a:p>
+        </p:txBody>
+      </p:sp>
+      <p:sp>
+        <p:nvSpPr>
+          <p:cNvPr id="28" name="TextBox 27"/>
+          <p:cNvSpPr txBox="1"/>
+          <p:nvPr/>
+        </p:nvSpPr>
+        <p:spPr>
+          <a:xfrm>
+            <a:off x="10753852" y="5711284"/>
+            <a:ext cx="836422" cy="307777"/>
+          </a:xfrm>
+          <a:prstGeom prst="rect">
+            <a:avLst/>
+          </a:prstGeom>
+          <a:noFill/>
+          <a:ln>
+            <a:solidFill>
+              <a:schemeClr val="tx1"/>
+            </a:solidFill>
+          </a:ln>
+        </p:spPr>
+        <p:txBody>
+          <a:bodyPr wrap="square" rtlCol="0">
+            <a:spAutoFit/>
+          </a:bodyPr>
+          <a:lstStyle/>
+          <a:p>
+            <a:r>
+              <a:rPr lang="en-US" sz="1400" dirty="0" smtClean="0"/>
+              <a:t>save</a:t>
+            </a:r>
+            <a:r>
+              <a:rPr lang="en-US" sz="1400" dirty="0" smtClean="0"/>
+              <a:t> </a:t>
+            </a:r>
+            <a:endParaRPr lang="en-US" sz="1400" dirty="0"/>
           </a:p>
         </p:txBody>
       </p:sp>

</xml_diff>

<commit_message>
get projects from login user: worked
</commit_message>
<xml_diff>
--- a/Geospatial Online Project.pptx
+++ b/Geospatial Online Project.pptx
@@ -3893,7 +3893,7 @@
         <p:spPr>
           <a:xfrm>
             <a:off x="7863840" y="1143522"/>
-            <a:ext cx="4123721" cy="2369880"/>
+            <a:ext cx="4123721" cy="2585323"/>
           </a:xfrm>
           <a:prstGeom prst="rect">
             <a:avLst/>
@@ -4089,6 +4089,60 @@
                 </a:solidFill>
               </a:rPr>
               <a:t>boolean</a:t>
+            </a:r>
+            <a:endParaRPr lang="en-US" sz="1400" dirty="0" smtClean="0">
+              <a:solidFill>
+                <a:schemeClr val="tx1">
+                  <a:lumMod val="95000"/>
+                  <a:lumOff val="5000"/>
+                </a:schemeClr>
+              </a:solidFill>
+            </a:endParaRPr>
+          </a:p>
+          <a:p>
+            <a:r>
+              <a:rPr lang="en-US" sz="1400" dirty="0" smtClean="0">
+                <a:solidFill>
+                  <a:schemeClr val="tx1">
+                    <a:lumMod val="95000"/>
+                    <a:lumOff val="5000"/>
+                  </a:schemeClr>
+                </a:solidFill>
+              </a:rPr>
+              <a:t>-</a:t>
+            </a:r>
+            <a:r>
+              <a:rPr lang="en-US" sz="1400" dirty="0" err="1" smtClean="0">
+                <a:solidFill>
+                  <a:schemeClr val="tx1">
+                    <a:lumMod val="95000"/>
+                    <a:lumOff val="5000"/>
+                  </a:schemeClr>
+                </a:solidFill>
+              </a:rPr>
+              <a:t>url</a:t>
+            </a:r>
+            <a:r>
+              <a:rPr lang="en-US" sz="1400" dirty="0" smtClean="0">
+                <a:solidFill>
+                  <a:schemeClr val="tx1">
+                    <a:lumMod val="95000"/>
+                    <a:lumOff val="5000"/>
+                  </a:schemeClr>
+                </a:solidFill>
+              </a:rPr>
+              <a:t> : string //feature </a:t>
+            </a:r>
+            <a:r>
+              <a:rPr lang="en-US" sz="1400" smtClean="0">
+                <a:solidFill>
+                  <a:schemeClr val="tx1">
+                    <a:lumMod val="95000"/>
+                    <a:lumOff val="5000"/>
+                  </a:schemeClr>
+                </a:solidFill>
+              </a:rPr>
+              <a:t>url</a:t>
             </a:r>
             <a:endParaRPr lang="en-US" sz="1400" dirty="0">
               <a:solidFill>
@@ -5244,7 +5298,7 @@
         <p:spPr>
           <a:xfrm>
             <a:off x="1969516" y="4330540"/>
-            <a:ext cx="915670" cy="307777"/>
+            <a:ext cx="1026160" cy="307777"/>
           </a:xfrm>
           <a:prstGeom prst="rect">
             <a:avLst/>

</xml_diff>